<commit_message>
Add 3 images to iros/image
</commit_message>
<xml_diff>
--- a/changgyu_참고자료/dataprocess.pptx
+++ b/changgyu_참고자료/dataprocess.pptx
@@ -197,7 +197,7 @@
           <a:p>
             <a:fld id="{FE1805B7-EC3E-4D61-8370-2171B591E0C1}" type="datetimeFigureOut">
               <a:rPr lang="ko-KR" altLang="en-US" smtClean="0"/>
-              <a:t>2019-01-07</a:t>
+              <a:t>2019-02-09</a:t>
             </a:fld>
             <a:endParaRPr lang="ko-KR" altLang="en-US"/>
           </a:p>
@@ -680,7 +680,7 @@
           <a:p>
             <a:fld id="{94530561-EC2C-41A6-A262-1FDC349A748A}" type="datetimeFigureOut">
               <a:rPr lang="ko-KR" altLang="en-US" smtClean="0"/>
-              <a:t>2019-01-07</a:t>
+              <a:t>2019-02-09</a:t>
             </a:fld>
             <a:endParaRPr lang="ko-KR" altLang="en-US"/>
           </a:p>
@@ -850,7 +850,7 @@
           <a:p>
             <a:fld id="{94530561-EC2C-41A6-A262-1FDC349A748A}" type="datetimeFigureOut">
               <a:rPr lang="ko-KR" altLang="en-US" smtClean="0"/>
-              <a:t>2019-01-07</a:t>
+              <a:t>2019-02-09</a:t>
             </a:fld>
             <a:endParaRPr lang="ko-KR" altLang="en-US"/>
           </a:p>
@@ -1030,7 +1030,7 @@
           <a:p>
             <a:fld id="{94530561-EC2C-41A6-A262-1FDC349A748A}" type="datetimeFigureOut">
               <a:rPr lang="ko-KR" altLang="en-US" smtClean="0"/>
-              <a:t>2019-01-07</a:t>
+              <a:t>2019-02-09</a:t>
             </a:fld>
             <a:endParaRPr lang="ko-KR" altLang="en-US"/>
           </a:p>
@@ -1200,7 +1200,7 @@
           <a:p>
             <a:fld id="{94530561-EC2C-41A6-A262-1FDC349A748A}" type="datetimeFigureOut">
               <a:rPr lang="ko-KR" altLang="en-US" smtClean="0"/>
-              <a:t>2019-01-07</a:t>
+              <a:t>2019-02-09</a:t>
             </a:fld>
             <a:endParaRPr lang="ko-KR" altLang="en-US"/>
           </a:p>
@@ -1444,7 +1444,7 @@
           <a:p>
             <a:fld id="{94530561-EC2C-41A6-A262-1FDC349A748A}" type="datetimeFigureOut">
               <a:rPr lang="ko-KR" altLang="en-US" smtClean="0"/>
-              <a:t>2019-01-07</a:t>
+              <a:t>2019-02-09</a:t>
             </a:fld>
             <a:endParaRPr lang="ko-KR" altLang="en-US"/>
           </a:p>
@@ -1676,7 +1676,7 @@
           <a:p>
             <a:fld id="{94530561-EC2C-41A6-A262-1FDC349A748A}" type="datetimeFigureOut">
               <a:rPr lang="ko-KR" altLang="en-US" smtClean="0"/>
-              <a:t>2019-01-07</a:t>
+              <a:t>2019-02-09</a:t>
             </a:fld>
             <a:endParaRPr lang="ko-KR" altLang="en-US"/>
           </a:p>
@@ -2043,7 +2043,7 @@
           <a:p>
             <a:fld id="{94530561-EC2C-41A6-A262-1FDC349A748A}" type="datetimeFigureOut">
               <a:rPr lang="ko-KR" altLang="en-US" smtClean="0"/>
-              <a:t>2019-01-07</a:t>
+              <a:t>2019-02-09</a:t>
             </a:fld>
             <a:endParaRPr lang="ko-KR" altLang="en-US"/>
           </a:p>
@@ -2161,7 +2161,7 @@
           <a:p>
             <a:fld id="{94530561-EC2C-41A6-A262-1FDC349A748A}" type="datetimeFigureOut">
               <a:rPr lang="ko-KR" altLang="en-US" smtClean="0"/>
-              <a:t>2019-01-07</a:t>
+              <a:t>2019-02-09</a:t>
             </a:fld>
             <a:endParaRPr lang="ko-KR" altLang="en-US"/>
           </a:p>
@@ -2256,7 +2256,7 @@
           <a:p>
             <a:fld id="{94530561-EC2C-41A6-A262-1FDC349A748A}" type="datetimeFigureOut">
               <a:rPr lang="ko-KR" altLang="en-US" smtClean="0"/>
-              <a:t>2019-01-07</a:t>
+              <a:t>2019-02-09</a:t>
             </a:fld>
             <a:endParaRPr lang="ko-KR" altLang="en-US"/>
           </a:p>
@@ -2533,7 +2533,7 @@
           <a:p>
             <a:fld id="{94530561-EC2C-41A6-A262-1FDC349A748A}" type="datetimeFigureOut">
               <a:rPr lang="ko-KR" altLang="en-US" smtClean="0"/>
-              <a:t>2019-01-07</a:t>
+              <a:t>2019-02-09</a:t>
             </a:fld>
             <a:endParaRPr lang="ko-KR" altLang="en-US"/>
           </a:p>
@@ -2790,7 +2790,7 @@
           <a:p>
             <a:fld id="{94530561-EC2C-41A6-A262-1FDC349A748A}" type="datetimeFigureOut">
               <a:rPr lang="ko-KR" altLang="en-US" smtClean="0"/>
-              <a:t>2019-01-07</a:t>
+              <a:t>2019-02-09</a:t>
             </a:fld>
             <a:endParaRPr lang="ko-KR" altLang="en-US"/>
           </a:p>
@@ -3003,7 +3003,7 @@
           <a:p>
             <a:fld id="{94530561-EC2C-41A6-A262-1FDC349A748A}" type="datetimeFigureOut">
               <a:rPr lang="ko-KR" altLang="en-US" smtClean="0"/>
-              <a:t>2019-01-07</a:t>
+              <a:t>2019-02-09</a:t>
             </a:fld>
             <a:endParaRPr lang="ko-KR" altLang="en-US"/>
           </a:p>
@@ -3416,7 +3416,7 @@
         </p:nvSpPr>
         <p:spPr>
           <a:xfrm>
-            <a:off x="3615881" y="4657246"/>
+            <a:off x="3615881" y="4510942"/>
             <a:ext cx="2328812" cy="1182838"/>
           </a:xfrm>
           <a:prstGeom prst="roundRect">
@@ -3478,7 +3478,7 @@
         </p:nvSpPr>
         <p:spPr>
           <a:xfrm>
-            <a:off x="6444019" y="3092271"/>
+            <a:off x="6444019" y="2945967"/>
             <a:ext cx="2599774" cy="1774257"/>
           </a:xfrm>
           <a:prstGeom prst="roundRect">
@@ -3566,7 +3566,7 @@
         </p:nvSpPr>
         <p:spPr>
           <a:xfrm>
-            <a:off x="3615881" y="2066003"/>
+            <a:off x="3615881" y="1919699"/>
             <a:ext cx="2328812" cy="1182838"/>
           </a:xfrm>
           <a:prstGeom prst="roundRect">
@@ -3631,7 +3631,7 @@
         </p:nvCxnSpPr>
         <p:spPr>
           <a:xfrm flipV="1">
-            <a:off x="5944694" y="3979399"/>
+            <a:off x="5944694" y="3833095"/>
             <a:ext cx="499325" cy="1269265"/>
           </a:xfrm>
           <a:prstGeom prst="bentConnector3">
@@ -3672,7 +3672,7 @@
         </p:nvCxnSpPr>
         <p:spPr>
           <a:xfrm>
-            <a:off x="5944694" y="2657422"/>
+            <a:off x="5944694" y="2511118"/>
             <a:ext cx="499325" cy="1321977"/>
           </a:xfrm>
           <a:prstGeom prst="bentConnector3">
@@ -3724,7 +3724,7 @@
         </p:blipFill>
         <p:spPr>
           <a:xfrm>
-            <a:off x="1949537" y="1760045"/>
+            <a:off x="1949537" y="1613741"/>
             <a:ext cx="1405015" cy="1774257"/>
           </a:xfrm>
           <a:prstGeom prst="rect">
@@ -3745,7 +3745,7 @@
         </p:nvSpPr>
         <p:spPr>
           <a:xfrm>
-            <a:off x="2307113" y="1758031"/>
+            <a:off x="2307113" y="1611727"/>
             <a:ext cx="662700" cy="466699"/>
           </a:xfrm>
           <a:prstGeom prst="ellipse">
@@ -3797,7 +3797,7 @@
         </p:nvCxnSpPr>
         <p:spPr>
           <a:xfrm flipV="1">
-            <a:off x="2652044" y="1551497"/>
+            <a:off x="2652044" y="1405193"/>
             <a:ext cx="240072" cy="208548"/>
           </a:xfrm>
           <a:prstGeom prst="straightConnector1">
@@ -3833,7 +3833,7 @@
         </p:nvSpPr>
         <p:spPr>
           <a:xfrm>
-            <a:off x="2008479" y="1028277"/>
+            <a:off x="2008479" y="881973"/>
             <a:ext cx="1767276" cy="523220"/>
           </a:xfrm>
           <a:prstGeom prst="rect">
@@ -3870,35 +3870,6 @@
           </a:p>
         </p:txBody>
       </p:sp>
-      <p:pic>
-        <p:nvPicPr>
-          <p:cNvPr id="54" name="그림 53"/>
-          <p:cNvPicPr>
-            <a:picLocks/>
-          </p:cNvPicPr>
-          <p:nvPr/>
-        </p:nvPicPr>
-        <p:blipFill>
-          <a:blip r:embed="rId4"/>
-          <a:stretch>
-            <a:fillRect/>
-          </a:stretch>
-        </p:blipFill>
-        <p:spPr>
-          <a:xfrm>
-            <a:off x="543518" y="4361536"/>
-            <a:ext cx="2810030" cy="1774257"/>
-          </a:xfrm>
-          <a:prstGeom prst="rect">
-            <a:avLst/>
-          </a:prstGeom>
-          <a:ln>
-            <a:solidFill>
-              <a:schemeClr val="tx1"/>
-            </a:solidFill>
-          </a:ln>
-        </p:spPr>
-      </p:pic>
       <p:sp>
         <p:nvSpPr>
           <p:cNvPr id="51" name="직사각형 50"/>
@@ -3907,8 +3878,8 @@
         </p:nvSpPr>
         <p:spPr>
           <a:xfrm>
-            <a:off x="-7366" y="3676186"/>
-            <a:ext cx="3786549" cy="523220"/>
+            <a:off x="41524" y="3529882"/>
+            <a:ext cx="3688767" cy="523220"/>
           </a:xfrm>
           <a:prstGeom prst="rect">
             <a:avLst/>
@@ -3930,7 +3901,18 @@
                 <a:ea typeface="배달의민족 주아"/>
                 <a:cs typeface="Times New Roman" panose="02020603050405020304" pitchFamily="18" charset="0"/>
               </a:rPr>
-              <a:t>Motion capture camera</a:t>
+              <a:t>Motion capture </a:t>
+            </a:r>
+            <a:r>
+              <a:rPr lang="en-US" altLang="ko-KR" sz="2800" b="1" dirty="0" smtClean="0">
+                <a:solidFill>
+                  <a:srgbClr val="002060"/>
+                </a:solidFill>
+                <a:latin typeface="Times New Roman" panose="02020603050405020304" pitchFamily="18" charset="0"/>
+                <a:ea typeface="배달의민족 주아"/>
+                <a:cs typeface="Times New Roman" panose="02020603050405020304" pitchFamily="18" charset="0"/>
+              </a:rPr>
+              <a:t>system</a:t>
             </a:r>
             <a:endParaRPr lang="ko-KR" altLang="en-US" sz="2800" b="1" dirty="0">
               <a:solidFill>
@@ -3942,94 +3924,6 @@
           </a:p>
         </p:txBody>
       </p:sp>
-      <p:sp>
-        <p:nvSpPr>
-          <p:cNvPr id="52" name="타원 51"/>
-          <p:cNvSpPr/>
-          <p:nvPr/>
-        </p:nvSpPr>
-        <p:spPr>
-          <a:xfrm>
-            <a:off x="2527952" y="4965644"/>
-            <a:ext cx="560537" cy="579666"/>
-          </a:xfrm>
-          <a:prstGeom prst="ellipse">
-            <a:avLst/>
-          </a:prstGeom>
-          <a:noFill/>
-          <a:ln w="25400">
-            <a:solidFill>
-              <a:srgbClr val="002060"/>
-            </a:solidFill>
-          </a:ln>
-        </p:spPr>
-        <p:style>
-          <a:lnRef idx="2">
-            <a:schemeClr val="accent1">
-              <a:shade val="50000"/>
-            </a:schemeClr>
-          </a:lnRef>
-          <a:fillRef idx="1">
-            <a:schemeClr val="accent1"/>
-          </a:fillRef>
-          <a:effectRef idx="0">
-            <a:schemeClr val="accent1"/>
-          </a:effectRef>
-          <a:fontRef idx="minor">
-            <a:schemeClr val="lt1"/>
-          </a:fontRef>
-        </p:style>
-        <p:txBody>
-          <a:bodyPr rtlCol="0" anchor="ctr"/>
-          <a:lstStyle/>
-          <a:p>
-            <a:pPr algn="ctr"/>
-            <a:endParaRPr lang="ko-KR" altLang="en-US" sz="1351">
-              <a:latin typeface="Times New Roman" panose="02020603050405020304" pitchFamily="18" charset="0"/>
-              <a:cs typeface="Times New Roman" panose="02020603050405020304" pitchFamily="18" charset="0"/>
-            </a:endParaRPr>
-          </a:p>
-        </p:txBody>
-      </p:sp>
-      <p:cxnSp>
-        <p:nvCxnSpPr>
-          <p:cNvPr id="53" name="직선 화살표 연결선 52"/>
-          <p:cNvCxnSpPr>
-            <a:stCxn id="52" idx="1"/>
-            <a:endCxn id="51" idx="2"/>
-          </p:cNvCxnSpPr>
-          <p:nvPr/>
-        </p:nvCxnSpPr>
-        <p:spPr>
-          <a:xfrm flipH="1" flipV="1">
-            <a:off x="1885909" y="4199406"/>
-            <a:ext cx="724132" cy="851128"/>
-          </a:xfrm>
-          <a:prstGeom prst="straightConnector1">
-            <a:avLst/>
-          </a:prstGeom>
-          <a:ln w="19050">
-            <a:solidFill>
-              <a:srgbClr val="002060"/>
-            </a:solidFill>
-            <a:tailEnd type="triangle"/>
-          </a:ln>
-        </p:spPr>
-        <p:style>
-          <a:lnRef idx="1">
-            <a:schemeClr val="accent1"/>
-          </a:lnRef>
-          <a:fillRef idx="0">
-            <a:schemeClr val="accent1"/>
-          </a:fillRef>
-          <a:effectRef idx="0">
-            <a:schemeClr val="accent1"/>
-          </a:effectRef>
-          <a:fontRef idx="minor">
-            <a:schemeClr val="tx1"/>
-          </a:fontRef>
-        </p:style>
-      </p:cxnSp>
       <p:cxnSp>
         <p:nvCxnSpPr>
           <p:cNvPr id="92" name="직선 화살표 연결선 91"/>
@@ -4041,7 +3935,7 @@
         </p:nvCxnSpPr>
         <p:spPr>
           <a:xfrm>
-            <a:off x="3354552" y="2647173"/>
+            <a:off x="3354552" y="2500869"/>
             <a:ext cx="261329" cy="10249"/>
           </a:xfrm>
           <a:prstGeom prst="straightConnector1">
@@ -4073,15 +3967,15 @@
         <p:nvCxnSpPr>
           <p:cNvPr id="94" name="직선 화살표 연결선 93"/>
           <p:cNvCxnSpPr>
-            <a:stCxn id="54" idx="3"/>
+            <a:stCxn id="7" idx="3"/>
             <a:endCxn id="57" idx="1"/>
           </p:cNvCxnSpPr>
           <p:nvPr/>
         </p:nvCxnSpPr>
         <p:spPr>
-          <a:xfrm>
-            <a:off x="3353548" y="5248665"/>
-            <a:ext cx="262333" cy="0"/>
+          <a:xfrm flipV="1">
+            <a:off x="3357685" y="5102361"/>
+            <a:ext cx="258196" cy="190"/>
           </a:xfrm>
           <a:prstGeom prst="straightConnector1">
             <a:avLst/>
@@ -4119,7 +4013,7 @@
         </p:nvCxnSpPr>
         <p:spPr>
           <a:xfrm>
-            <a:off x="1655271" y="2647173"/>
+            <a:off x="1655271" y="2500869"/>
             <a:ext cx="294266" cy="0"/>
           </a:xfrm>
           <a:prstGeom prst="line">
@@ -4155,7 +4049,7 @@
           <p:nvPr/>
         </p:nvPicPr>
         <p:blipFill>
-          <a:blip r:embed="rId5" cstate="print">
+          <a:blip r:embed="rId4" cstate="print">
             <a:extLst>
               <a:ext uri="{28A0092B-C50C-407E-A947-70E740481C1C}">
                 <a14:useLocalDpi xmlns:a14="http://schemas.microsoft.com/office/drawing/2010/main" val="0"/>
@@ -4168,7 +4062,7 @@
         </p:blipFill>
         <p:spPr>
           <a:xfrm>
-            <a:off x="531258" y="1760045"/>
+            <a:off x="531258" y="1613741"/>
             <a:ext cx="1124012" cy="1774257"/>
           </a:xfrm>
           <a:prstGeom prst="rect">
@@ -4189,7 +4083,7 @@
         </p:nvSpPr>
         <p:spPr>
           <a:xfrm>
-            <a:off x="776788" y="1922977"/>
+            <a:off x="776788" y="1776673"/>
             <a:ext cx="629547" cy="450418"/>
           </a:xfrm>
           <a:prstGeom prst="ellipse">
@@ -4238,7 +4132,7 @@
         </p:nvSpPr>
         <p:spPr>
           <a:xfrm>
-            <a:off x="-151751" y="1040595"/>
+            <a:off x="-151751" y="894291"/>
             <a:ext cx="2375589" cy="523220"/>
           </a:xfrm>
           <a:prstGeom prst="rect">
@@ -4285,7 +4179,7 @@
         </p:nvCxnSpPr>
         <p:spPr>
           <a:xfrm flipH="1" flipV="1">
-            <a:off x="1036044" y="1563815"/>
+            <a:off x="1036044" y="1417511"/>
             <a:ext cx="45410" cy="344116"/>
           </a:xfrm>
           <a:prstGeom prst="straightConnector1">
@@ -4313,6 +4207,91 @@
           </a:fontRef>
         </p:style>
       </p:cxnSp>
+      <p:grpSp>
+        <p:nvGrpSpPr>
+          <p:cNvPr id="8" name="그룹 7"/>
+          <p:cNvGrpSpPr/>
+          <p:nvPr/>
+        </p:nvGrpSpPr>
+        <p:grpSpPr>
+          <a:xfrm>
+            <a:off x="458554" y="4202551"/>
+            <a:ext cx="2899131" cy="1800000"/>
+            <a:chOff x="421978" y="4348855"/>
+            <a:chExt cx="2899131" cy="1800000"/>
+          </a:xfrm>
+        </p:grpSpPr>
+        <p:pic>
+          <p:nvPicPr>
+            <p:cNvPr id="5" name="그림 4"/>
+            <p:cNvPicPr>
+              <a:picLocks noChangeAspect="1"/>
+            </p:cNvPicPr>
+            <p:nvPr/>
+          </p:nvPicPr>
+          <p:blipFill>
+            <a:blip r:embed="rId5" cstate="print">
+              <a:extLst>
+                <a:ext uri="{28A0092B-C50C-407E-A947-70E740481C1C}">
+                  <a14:useLocalDpi xmlns:a14="http://schemas.microsoft.com/office/drawing/2010/main" val="0"/>
+                </a:ext>
+              </a:extLst>
+            </a:blip>
+            <a:stretch>
+              <a:fillRect/>
+            </a:stretch>
+          </p:blipFill>
+          <p:spPr>
+            <a:xfrm>
+              <a:off x="421978" y="4348855"/>
+              <a:ext cx="1557313" cy="1800000"/>
+            </a:xfrm>
+            <a:prstGeom prst="rect">
+              <a:avLst/>
+            </a:prstGeom>
+            <a:ln>
+              <a:solidFill>
+                <a:schemeClr val="tx1"/>
+              </a:solidFill>
+            </a:ln>
+          </p:spPr>
+        </p:pic>
+        <p:pic>
+          <p:nvPicPr>
+            <p:cNvPr id="7" name="그림 6"/>
+            <p:cNvPicPr>
+              <a:picLocks noChangeAspect="1"/>
+            </p:cNvPicPr>
+            <p:nvPr/>
+          </p:nvPicPr>
+          <p:blipFill>
+            <a:blip r:embed="rId6" cstate="print">
+              <a:extLst>
+                <a:ext uri="{28A0092B-C50C-407E-A947-70E740481C1C}">
+                  <a14:useLocalDpi xmlns:a14="http://schemas.microsoft.com/office/drawing/2010/main" val="0"/>
+                </a:ext>
+              </a:extLst>
+            </a:blip>
+            <a:stretch>
+              <a:fillRect/>
+            </a:stretch>
+          </p:blipFill>
+          <p:spPr>
+            <a:xfrm>
+              <a:off x="1971109" y="4348855"/>
+              <a:ext cx="1350000" cy="1800000"/>
+            </a:xfrm>
+            <a:prstGeom prst="rect">
+              <a:avLst/>
+            </a:prstGeom>
+            <a:ln>
+              <a:solidFill>
+                <a:schemeClr val="tx1"/>
+              </a:solidFill>
+            </a:ln>
+          </p:spPr>
+        </p:pic>
+      </p:grpSp>
     </p:spTree>
     <p:extLst>
       <p:ext uri="{BB962C8B-B14F-4D97-AF65-F5344CB8AC3E}">

</xml_diff>